<commit_message>
Loan Origination with ML and RPA
</commit_message>
<xml_diff>
--- a/20220213_ML and RPA in Loan Origination/diagrams.pptx
+++ b/20220213_ML and RPA in Loan Origination/diagrams.pptx
@@ -29861,7 +29861,7 @@
           <a:p>
             <a:fld id="{BB6CB575-90B8-49EE-8178-238733889827}" type="datetimeFigureOut">
               <a:rPr lang="en-IN" smtClean="0"/>
-              <a:t>14-02-2022</a:t>
+              <a:t>19-04-2022</a:t>
             </a:fld>
             <a:endParaRPr lang="en-IN"/>
           </a:p>
@@ -30061,7 +30061,7 @@
           <a:p>
             <a:fld id="{BB6CB575-90B8-49EE-8178-238733889827}" type="datetimeFigureOut">
               <a:rPr lang="en-IN" smtClean="0"/>
-              <a:t>14-02-2022</a:t>
+              <a:t>19-04-2022</a:t>
             </a:fld>
             <a:endParaRPr lang="en-IN"/>
           </a:p>
@@ -30271,7 +30271,7 @@
           <a:p>
             <a:fld id="{BB6CB575-90B8-49EE-8178-238733889827}" type="datetimeFigureOut">
               <a:rPr lang="en-IN" smtClean="0"/>
-              <a:t>14-02-2022</a:t>
+              <a:t>19-04-2022</a:t>
             </a:fld>
             <a:endParaRPr lang="en-IN"/>
           </a:p>
@@ -30471,7 +30471,7 @@
           <a:p>
             <a:fld id="{BB6CB575-90B8-49EE-8178-238733889827}" type="datetimeFigureOut">
               <a:rPr lang="en-IN" smtClean="0"/>
-              <a:t>14-02-2022</a:t>
+              <a:t>19-04-2022</a:t>
             </a:fld>
             <a:endParaRPr lang="en-IN"/>
           </a:p>
@@ -30747,7 +30747,7 @@
           <a:p>
             <a:fld id="{BB6CB575-90B8-49EE-8178-238733889827}" type="datetimeFigureOut">
               <a:rPr lang="en-IN" smtClean="0"/>
-              <a:t>14-02-2022</a:t>
+              <a:t>19-04-2022</a:t>
             </a:fld>
             <a:endParaRPr lang="en-IN"/>
           </a:p>
@@ -31015,7 +31015,7 @@
           <a:p>
             <a:fld id="{BB6CB575-90B8-49EE-8178-238733889827}" type="datetimeFigureOut">
               <a:rPr lang="en-IN" smtClean="0"/>
-              <a:t>14-02-2022</a:t>
+              <a:t>19-04-2022</a:t>
             </a:fld>
             <a:endParaRPr lang="en-IN"/>
           </a:p>
@@ -31430,7 +31430,7 @@
           <a:p>
             <a:fld id="{BB6CB575-90B8-49EE-8178-238733889827}" type="datetimeFigureOut">
               <a:rPr lang="en-IN" smtClean="0"/>
-              <a:t>14-02-2022</a:t>
+              <a:t>19-04-2022</a:t>
             </a:fld>
             <a:endParaRPr lang="en-IN"/>
           </a:p>
@@ -31572,7 +31572,7 @@
           <a:p>
             <a:fld id="{BB6CB575-90B8-49EE-8178-238733889827}" type="datetimeFigureOut">
               <a:rPr lang="en-IN" smtClean="0"/>
-              <a:t>14-02-2022</a:t>
+              <a:t>19-04-2022</a:t>
             </a:fld>
             <a:endParaRPr lang="en-IN"/>
           </a:p>
@@ -31685,7 +31685,7 @@
           <a:p>
             <a:fld id="{BB6CB575-90B8-49EE-8178-238733889827}" type="datetimeFigureOut">
               <a:rPr lang="en-IN" smtClean="0"/>
-              <a:t>14-02-2022</a:t>
+              <a:t>19-04-2022</a:t>
             </a:fld>
             <a:endParaRPr lang="en-IN"/>
           </a:p>
@@ -31998,7 +31998,7 @@
           <a:p>
             <a:fld id="{BB6CB575-90B8-49EE-8178-238733889827}" type="datetimeFigureOut">
               <a:rPr lang="en-IN" smtClean="0"/>
-              <a:t>14-02-2022</a:t>
+              <a:t>19-04-2022</a:t>
             </a:fld>
             <a:endParaRPr lang="en-IN"/>
           </a:p>
@@ -32287,7 +32287,7 @@
           <a:p>
             <a:fld id="{BB6CB575-90B8-49EE-8178-238733889827}" type="datetimeFigureOut">
               <a:rPr lang="en-IN" smtClean="0"/>
-              <a:t>14-02-2022</a:t>
+              <a:t>19-04-2022</a:t>
             </a:fld>
             <a:endParaRPr lang="en-IN"/>
           </a:p>
@@ -32530,7 +32530,7 @@
           <a:p>
             <a:fld id="{BB6CB575-90B8-49EE-8178-238733889827}" type="datetimeFigureOut">
               <a:rPr lang="en-IN" smtClean="0"/>
-              <a:t>14-02-2022</a:t>
+              <a:t>19-04-2022</a:t>
             </a:fld>
             <a:endParaRPr lang="en-IN"/>
           </a:p>
@@ -33163,7 +33163,7 @@
         <p:spPr>
           <a:xfrm>
             <a:off x="4322806" y="6288657"/>
-            <a:ext cx="3667158" cy="369332"/>
+            <a:ext cx="3553409" cy="369332"/>
           </a:xfrm>
           <a:prstGeom prst="rect">
             <a:avLst/>
@@ -33178,7 +33178,7 @@
           <a:p>
             <a:r>
               <a:rPr lang="en-IN" u="sng" dirty="0"/>
-              <a:t>Mortgage or Loan Processing Process</a:t>
+              <a:t>Mortgage or Loan Processing Steps</a:t>
             </a:r>
           </a:p>
         </p:txBody>

</xml_diff>